<commit_message>
create magnetic vector potential
</commit_message>
<xml_diff>
--- a/content/posts/WPT/mutual-indcution/images/mutual-induction.pptx
+++ b/content/posts/WPT/mutual-indcution/images/mutual-induction.pptx
@@ -263,7 +263,7 @@
           <a:p>
             <a:fld id="{A4A357DC-28B9-4DBB-84B0-759140EC3D54}" type="datetimeFigureOut">
               <a:rPr lang="en-US" smtClean="0"/>
-              <a:t>4/8/2025</a:t>
+              <a:t>4/17/2025</a:t>
             </a:fld>
             <a:endParaRPr lang="en-US"/>
           </a:p>
@@ -461,7 +461,7 @@
           <a:p>
             <a:fld id="{A4A357DC-28B9-4DBB-84B0-759140EC3D54}" type="datetimeFigureOut">
               <a:rPr lang="en-US" smtClean="0"/>
-              <a:t>4/8/2025</a:t>
+              <a:t>4/17/2025</a:t>
             </a:fld>
             <a:endParaRPr lang="en-US"/>
           </a:p>
@@ -669,7 +669,7 @@
           <a:p>
             <a:fld id="{A4A357DC-28B9-4DBB-84B0-759140EC3D54}" type="datetimeFigureOut">
               <a:rPr lang="en-US" smtClean="0"/>
-              <a:t>4/8/2025</a:t>
+              <a:t>4/17/2025</a:t>
             </a:fld>
             <a:endParaRPr lang="en-US"/>
           </a:p>
@@ -867,7 +867,7 @@
           <a:p>
             <a:fld id="{A4A357DC-28B9-4DBB-84B0-759140EC3D54}" type="datetimeFigureOut">
               <a:rPr lang="en-US" smtClean="0"/>
-              <a:t>4/8/2025</a:t>
+              <a:t>4/17/2025</a:t>
             </a:fld>
             <a:endParaRPr lang="en-US"/>
           </a:p>
@@ -1142,7 +1142,7 @@
           <a:p>
             <a:fld id="{A4A357DC-28B9-4DBB-84B0-759140EC3D54}" type="datetimeFigureOut">
               <a:rPr lang="en-US" smtClean="0"/>
-              <a:t>4/8/2025</a:t>
+              <a:t>4/17/2025</a:t>
             </a:fld>
             <a:endParaRPr lang="en-US"/>
           </a:p>
@@ -1407,7 +1407,7 @@
           <a:p>
             <a:fld id="{A4A357DC-28B9-4DBB-84B0-759140EC3D54}" type="datetimeFigureOut">
               <a:rPr lang="en-US" smtClean="0"/>
-              <a:t>4/8/2025</a:t>
+              <a:t>4/17/2025</a:t>
             </a:fld>
             <a:endParaRPr lang="en-US"/>
           </a:p>
@@ -1819,7 +1819,7 @@
           <a:p>
             <a:fld id="{A4A357DC-28B9-4DBB-84B0-759140EC3D54}" type="datetimeFigureOut">
               <a:rPr lang="en-US" smtClean="0"/>
-              <a:t>4/8/2025</a:t>
+              <a:t>4/17/2025</a:t>
             </a:fld>
             <a:endParaRPr lang="en-US"/>
           </a:p>
@@ -1960,7 +1960,7 @@
           <a:p>
             <a:fld id="{A4A357DC-28B9-4DBB-84B0-759140EC3D54}" type="datetimeFigureOut">
               <a:rPr lang="en-US" smtClean="0"/>
-              <a:t>4/8/2025</a:t>
+              <a:t>4/17/2025</a:t>
             </a:fld>
             <a:endParaRPr lang="en-US"/>
           </a:p>
@@ -2073,7 +2073,7 @@
           <a:p>
             <a:fld id="{A4A357DC-28B9-4DBB-84B0-759140EC3D54}" type="datetimeFigureOut">
               <a:rPr lang="en-US" smtClean="0"/>
-              <a:t>4/8/2025</a:t>
+              <a:t>4/17/2025</a:t>
             </a:fld>
             <a:endParaRPr lang="en-US"/>
           </a:p>
@@ -2384,7 +2384,7 @@
           <a:p>
             <a:fld id="{A4A357DC-28B9-4DBB-84B0-759140EC3D54}" type="datetimeFigureOut">
               <a:rPr lang="en-US" smtClean="0"/>
-              <a:t>4/8/2025</a:t>
+              <a:t>4/17/2025</a:t>
             </a:fld>
             <a:endParaRPr lang="en-US"/>
           </a:p>
@@ -2672,7 +2672,7 @@
           <a:p>
             <a:fld id="{A4A357DC-28B9-4DBB-84B0-759140EC3D54}" type="datetimeFigureOut">
               <a:rPr lang="en-US" smtClean="0"/>
-              <a:t>4/8/2025</a:t>
+              <a:t>4/17/2025</a:t>
             </a:fld>
             <a:endParaRPr lang="en-US"/>
           </a:p>
@@ -2913,7 +2913,7 @@
           <a:p>
             <a:fld id="{A4A357DC-28B9-4DBB-84B0-759140EC3D54}" type="datetimeFigureOut">
               <a:rPr lang="en-US" smtClean="0"/>
-              <a:t>4/8/2025</a:t>
+              <a:t>4/17/2025</a:t>
             </a:fld>
             <a:endParaRPr lang="en-US"/>
           </a:p>
@@ -5023,8 +5023,8 @@
           </a:fontRef>
         </p:style>
       </p:cxnSp>
-      <mc:AlternateContent xmlns:mc="http://schemas.openxmlformats.org/markup-compatibility/2006" xmlns:a14="http://schemas.microsoft.com/office/drawing/2010/main">
-        <mc:Choice Requires="a14">
+      <mc:AlternateContent xmlns:mc="http://schemas.openxmlformats.org/markup-compatibility/2006">
+        <mc:Choice xmlns:a14="http://schemas.microsoft.com/office/drawing/2010/main" Requires="a14">
           <p:sp>
             <p:nvSpPr>
               <p:cNvPr id="68" name="TextBox 67">
@@ -5081,7 +5081,7 @@
                             <a:rPr lang="en-US" b="0" i="1" smtClean="0">
                               <a:latin typeface="Cambria Math" panose="02040503050406030204" pitchFamily="18" charset="0"/>
                             </a:rPr>
-                            <m:t>𝑇</m:t>
+                            <m:t>1</m:t>
                           </m:r>
                         </m:sub>
                       </m:sSub>
@@ -5093,7 +5093,7 @@
             </p:txBody>
           </p:sp>
         </mc:Choice>
-        <mc:Fallback xmlns="">
+        <mc:Fallback>
           <p:sp>
             <p:nvSpPr>
               <p:cNvPr id="68" name="TextBox 67">
@@ -5119,7 +5119,7 @@
               <a:blipFill>
                 <a:blip r:embed="rId2"/>
                 <a:stretch>
-                  <a:fillRect r="-5769"/>
+                  <a:fillRect/>
                 </a:stretch>
               </a:blipFill>
             </p:spPr>
@@ -5138,8 +5138,8 @@
           </p:sp>
         </mc:Fallback>
       </mc:AlternateContent>
-      <mc:AlternateContent xmlns:mc="http://schemas.openxmlformats.org/markup-compatibility/2006" xmlns:a14="http://schemas.microsoft.com/office/drawing/2010/main">
-        <mc:Choice Requires="a14">
+      <mc:AlternateContent xmlns:mc="http://schemas.openxmlformats.org/markup-compatibility/2006">
+        <mc:Choice xmlns:a14="http://schemas.microsoft.com/office/drawing/2010/main" Requires="a14">
           <p:sp>
             <p:nvSpPr>
               <p:cNvPr id="75" name="TextBox 74">
@@ -5155,142 +5155,7 @@
             <p:spPr>
               <a:xfrm>
                 <a:off x="3372889" y="1575317"/>
-                <a:ext cx="228204" cy="276999"/>
-              </a:xfrm>
-              <a:prstGeom prst="rect">
-                <a:avLst/>
-              </a:prstGeom>
-              <a:noFill/>
-            </p:spPr>
-            <p:txBody>
-              <a:bodyPr wrap="none" lIns="0" tIns="0" rIns="0" bIns="0" rtlCol="0">
-                <a:spAutoFit/>
-              </a:bodyPr>
-              <a:lstStyle/>
-              <a:p>
-                <a:pPr/>
-                <a14:m>
-                  <m:oMathPara xmlns:m="http://schemas.openxmlformats.org/officeDocument/2006/math">
-                    <m:oMathParaPr>
-                      <m:jc m:val="centerGroup"/>
-                    </m:oMathParaPr>
-                    <m:oMath xmlns:m="http://schemas.openxmlformats.org/officeDocument/2006/math">
-                      <m:r>
-                        <a:rPr lang="en-US" i="1" smtClean="0">
-                          <a:latin typeface="Cambria Math" panose="02040503050406030204" pitchFamily="18" charset="0"/>
-                        </a:rPr>
-                        <m:t>𝛷</m:t>
-                      </m:r>
-                    </m:oMath>
-                  </m:oMathPara>
-                </a14:m>
-                <a:endParaRPr lang="en-US" dirty="0"/>
-              </a:p>
-            </p:txBody>
-          </p:sp>
-        </mc:Choice>
-        <mc:Fallback xmlns="">
-          <p:sp>
-            <p:nvSpPr>
-              <p:cNvPr id="75" name="TextBox 74">
-                <a:extLst>
-                  <a:ext uri="{FF2B5EF4-FFF2-40B4-BE49-F238E27FC236}">
-                    <a16:creationId xmlns:a16="http://schemas.microsoft.com/office/drawing/2014/main" id="{54588789-2871-426A-B77F-A03A68912A3D}"/>
-                  </a:ext>
-                </a:extLst>
-              </p:cNvPr>
-              <p:cNvSpPr txBox="1">
-                <a:spLocks noRot="1" noChangeAspect="1" noMove="1" noResize="1" noEditPoints="1" noAdjustHandles="1" noChangeArrowheads="1" noChangeShapeType="1" noTextEdit="1"/>
-              </p:cNvSpPr>
-              <p:nvPr/>
-            </p:nvSpPr>
-            <p:spPr>
-              <a:xfrm>
-                <a:off x="3372889" y="1575317"/>
-                <a:ext cx="228204" cy="276999"/>
-              </a:xfrm>
-              <a:prstGeom prst="rect">
-                <a:avLst/>
-              </a:prstGeom>
-              <a:blipFill>
-                <a:blip r:embed="rId3"/>
-                <a:stretch>
-                  <a:fillRect l="-23684" r="-21053" b="-6522"/>
-                </a:stretch>
-              </a:blipFill>
-            </p:spPr>
-            <p:txBody>
-              <a:bodyPr/>
-              <a:lstStyle/>
-              <a:p>
-                <a:r>
-                  <a:rPr lang="en-US">
-                    <a:noFill/>
-                  </a:rPr>
-                  <a:t> </a:t>
-                </a:r>
-              </a:p>
-            </p:txBody>
-          </p:sp>
-        </mc:Fallback>
-      </mc:AlternateContent>
-      <p:cxnSp>
-        <p:nvCxnSpPr>
-          <p:cNvPr id="77" name="Straight Arrow Connector 76">
-            <a:extLst>
-              <a:ext uri="{FF2B5EF4-FFF2-40B4-BE49-F238E27FC236}">
-                <a16:creationId xmlns:a16="http://schemas.microsoft.com/office/drawing/2014/main" id="{1F206899-4BE3-4371-9636-3D95DAF6B272}"/>
-              </a:ext>
-            </a:extLst>
-          </p:cNvPr>
-          <p:cNvCxnSpPr/>
-          <p:nvPr/>
-        </p:nvCxnSpPr>
-        <p:spPr>
-          <a:xfrm flipV="1">
-            <a:off x="4483184" y="2887636"/>
-            <a:ext cx="327056" cy="14185"/>
-          </a:xfrm>
-          <a:prstGeom prst="straightConnector1">
-            <a:avLst/>
-          </a:prstGeom>
-          <a:ln w="28575">
-            <a:tailEnd type="triangle"/>
-          </a:ln>
-        </p:spPr>
-        <p:style>
-          <a:lnRef idx="1">
-            <a:schemeClr val="accent2"/>
-          </a:lnRef>
-          <a:fillRef idx="0">
-            <a:schemeClr val="accent2"/>
-          </a:fillRef>
-          <a:effectRef idx="0">
-            <a:schemeClr val="accent2"/>
-          </a:effectRef>
-          <a:fontRef idx="minor">
-            <a:schemeClr val="tx1"/>
-          </a:fontRef>
-        </p:style>
-      </p:cxnSp>
-      <mc:AlternateContent xmlns:mc="http://schemas.openxmlformats.org/markup-compatibility/2006" xmlns:a14="http://schemas.microsoft.com/office/drawing/2010/main">
-        <mc:Choice Requires="a14">
-          <p:sp>
-            <p:nvSpPr>
-              <p:cNvPr id="5" name="TextBox 4">
-                <a:extLst>
-                  <a:ext uri="{FF2B5EF4-FFF2-40B4-BE49-F238E27FC236}">
-                    <a16:creationId xmlns:a16="http://schemas.microsoft.com/office/drawing/2014/main" id="{4193709A-E42C-4D7F-8233-28F3034BC565}"/>
-                  </a:ext>
-                </a:extLst>
-              </p:cNvPr>
-              <p:cNvSpPr txBox="1"/>
-              <p:nvPr/>
-            </p:nvSpPr>
-            <p:spPr>
-              <a:xfrm>
-                <a:off x="2313421" y="4891598"/>
-                <a:ext cx="272639" cy="276999"/>
+                <a:ext cx="419923" cy="276999"/>
               </a:xfrm>
               <a:prstGeom prst="rect">
                 <a:avLst/>
@@ -5315,23 +5180,26 @@
                           <m:ctrlPr>
                             <a:rPr lang="en-US" b="0" i="1" smtClean="0">
                               <a:latin typeface="Cambria Math" panose="02040503050406030204" pitchFamily="18" charset="0"/>
+                              <a:ea typeface="Cambria Math" panose="02040503050406030204" pitchFamily="18" charset="0"/>
                             </a:rPr>
                           </m:ctrlPr>
                         </m:sSubPr>
                         <m:e>
                           <m:r>
-                            <a:rPr lang="en-US" b="0" i="1" smtClean="0">
+                            <a:rPr lang="en-US" i="1" smtClean="0">
                               <a:latin typeface="Cambria Math" panose="02040503050406030204" pitchFamily="18" charset="0"/>
+                              <a:ea typeface="Cambria Math" panose="02040503050406030204" pitchFamily="18" charset="0"/>
                             </a:rPr>
-                            <m:t>𝑇</m:t>
+                            <m:t>𝜓</m:t>
                           </m:r>
                         </m:e>
                         <m:sub>
                           <m:r>
                             <a:rPr lang="en-US" b="0" i="1" smtClean="0">
                               <a:latin typeface="Cambria Math" panose="02040503050406030204" pitchFamily="18" charset="0"/>
+                              <a:ea typeface="Cambria Math" panose="02040503050406030204" pitchFamily="18" charset="0"/>
                             </a:rPr>
-                            <m:t>𝑥</m:t>
+                            <m:t>21</m:t>
                           </m:r>
                         </m:sub>
                       </m:sSub>
@@ -5343,13 +5211,13 @@
             </p:txBody>
           </p:sp>
         </mc:Choice>
-        <mc:Fallback xmlns="">
+        <mc:Fallback>
           <p:sp>
             <p:nvSpPr>
-              <p:cNvPr id="5" name="TextBox 4">
+              <p:cNvPr id="75" name="TextBox 74">
                 <a:extLst>
                   <a:ext uri="{FF2B5EF4-FFF2-40B4-BE49-F238E27FC236}">
-                    <a16:creationId xmlns:a16="http://schemas.microsoft.com/office/drawing/2014/main" id="{4193709A-E42C-4D7F-8233-28F3034BC565}"/>
+                    <a16:creationId xmlns:a16="http://schemas.microsoft.com/office/drawing/2014/main" id="{54588789-2871-426A-B77F-A03A68912A3D}"/>
                   </a:ext>
                 </a:extLst>
               </p:cNvPr>
@@ -5360,16 +5228,16 @@
             </p:nvSpPr>
             <p:spPr>
               <a:xfrm>
-                <a:off x="2313421" y="4891598"/>
-                <a:ext cx="272639" cy="276999"/>
+                <a:off x="3372889" y="1575317"/>
+                <a:ext cx="419923" cy="276999"/>
               </a:xfrm>
               <a:prstGeom prst="rect">
                 <a:avLst/>
               </a:prstGeom>
               <a:blipFill>
-                <a:blip r:embed="rId4"/>
+                <a:blip r:embed="rId3"/>
                 <a:stretch>
-                  <a:fillRect l="-20000" r="-4444" b="-10870"/>
+                  <a:fillRect l="-18841" t="-2174" r="-7246" b="-32609"/>
                 </a:stretch>
               </a:blipFill>
             </p:spPr>
@@ -5388,123 +5256,49 @@
           </p:sp>
         </mc:Fallback>
       </mc:AlternateContent>
-      <mc:AlternateContent xmlns:mc="http://schemas.openxmlformats.org/markup-compatibility/2006" xmlns:a14="http://schemas.microsoft.com/office/drawing/2010/main">
-        <mc:Choice Requires="a14">
-          <p:sp>
-            <p:nvSpPr>
-              <p:cNvPr id="84" name="TextBox 83">
-                <a:extLst>
-                  <a:ext uri="{FF2B5EF4-FFF2-40B4-BE49-F238E27FC236}">
-                    <a16:creationId xmlns:a16="http://schemas.microsoft.com/office/drawing/2014/main" id="{5BC1AB5D-6863-4057-9303-AEC596AE894B}"/>
-                  </a:ext>
-                </a:extLst>
-              </p:cNvPr>
-              <p:cNvSpPr txBox="1"/>
-              <p:nvPr/>
-            </p:nvSpPr>
-            <p:spPr>
-              <a:xfrm>
-                <a:off x="4242944" y="4891598"/>
-                <a:ext cx="309828" cy="276999"/>
-              </a:xfrm>
-              <a:prstGeom prst="rect">
-                <a:avLst/>
-              </a:prstGeom>
-              <a:noFill/>
-            </p:spPr>
-            <p:txBody>
-              <a:bodyPr wrap="none" lIns="0" tIns="0" rIns="0" bIns="0" rtlCol="0">
-                <a:spAutoFit/>
-              </a:bodyPr>
-              <a:lstStyle/>
-              <a:p>
-                <a:pPr/>
-                <a14:m>
-                  <m:oMathPara xmlns:m="http://schemas.openxmlformats.org/officeDocument/2006/math">
-                    <m:oMathParaPr>
-                      <m:jc m:val="centerGroup"/>
-                    </m:oMathParaPr>
-                    <m:oMath xmlns:m="http://schemas.openxmlformats.org/officeDocument/2006/math">
-                      <m:sSub>
-                        <m:sSubPr>
-                          <m:ctrlPr>
-                            <a:rPr lang="en-US" b="0" i="1" smtClean="0">
-                              <a:latin typeface="Cambria Math" panose="02040503050406030204" pitchFamily="18" charset="0"/>
-                            </a:rPr>
-                          </m:ctrlPr>
-                        </m:sSubPr>
-                        <m:e>
-                          <m:r>
-                            <a:rPr lang="en-US" b="0" i="1" smtClean="0">
-                              <a:latin typeface="Cambria Math" panose="02040503050406030204" pitchFamily="18" charset="0"/>
-                            </a:rPr>
-                            <m:t>𝑅</m:t>
-                          </m:r>
-                        </m:e>
-                        <m:sub>
-                          <m:r>
-                            <a:rPr lang="en-US" b="0" i="1" smtClean="0">
-                              <a:latin typeface="Cambria Math" panose="02040503050406030204" pitchFamily="18" charset="0"/>
-                            </a:rPr>
-                            <m:t>𝑥</m:t>
-                          </m:r>
-                        </m:sub>
-                      </m:sSub>
-                    </m:oMath>
-                  </m:oMathPara>
-                </a14:m>
-                <a:endParaRPr lang="en-US" dirty="0"/>
-              </a:p>
-            </p:txBody>
-          </p:sp>
-        </mc:Choice>
-        <mc:Fallback xmlns="">
-          <p:sp>
-            <p:nvSpPr>
-              <p:cNvPr id="84" name="TextBox 83">
-                <a:extLst>
-                  <a:ext uri="{FF2B5EF4-FFF2-40B4-BE49-F238E27FC236}">
-                    <a16:creationId xmlns:a16="http://schemas.microsoft.com/office/drawing/2014/main" id="{5BC1AB5D-6863-4057-9303-AEC596AE894B}"/>
-                  </a:ext>
-                </a:extLst>
-              </p:cNvPr>
-              <p:cNvSpPr txBox="1">
-                <a:spLocks noRot="1" noChangeAspect="1" noMove="1" noResize="1" noEditPoints="1" noAdjustHandles="1" noChangeArrowheads="1" noChangeShapeType="1" noTextEdit="1"/>
-              </p:cNvSpPr>
-              <p:nvPr/>
-            </p:nvSpPr>
-            <p:spPr>
-              <a:xfrm>
-                <a:off x="4242944" y="4891598"/>
-                <a:ext cx="309828" cy="276999"/>
-              </a:xfrm>
-              <a:prstGeom prst="rect">
-                <a:avLst/>
-              </a:prstGeom>
-              <a:blipFill>
-                <a:blip r:embed="rId5"/>
-                <a:stretch>
-                  <a:fillRect l="-15686" r="-3922" b="-10870"/>
-                </a:stretch>
-              </a:blipFill>
-            </p:spPr>
-            <p:txBody>
-              <a:bodyPr/>
-              <a:lstStyle/>
-              <a:p>
-                <a:r>
-                  <a:rPr lang="en-US">
-                    <a:noFill/>
-                  </a:rPr>
-                  <a:t> </a:t>
-                </a:r>
-              </a:p>
-            </p:txBody>
-          </p:sp>
-        </mc:Fallback>
-      </mc:AlternateContent>
-      <mc:AlternateContent xmlns:mc="http://schemas.openxmlformats.org/markup-compatibility/2006" xmlns:a14="http://schemas.microsoft.com/office/drawing/2010/main">
-        <mc:Choice Requires="a14">
+      <p:cxnSp>
+        <p:nvCxnSpPr>
+          <p:cNvPr id="77" name="Straight Arrow Connector 76">
+            <a:extLst>
+              <a:ext uri="{FF2B5EF4-FFF2-40B4-BE49-F238E27FC236}">
+                <a16:creationId xmlns:a16="http://schemas.microsoft.com/office/drawing/2014/main" id="{1F206899-4BE3-4371-9636-3D95DAF6B272}"/>
+              </a:ext>
+            </a:extLst>
+          </p:cNvPr>
+          <p:cNvCxnSpPr>
+            <a:cxnSpLocks/>
+          </p:cNvCxnSpPr>
+          <p:nvPr/>
+        </p:nvCxnSpPr>
+        <p:spPr>
+          <a:xfrm flipH="1" flipV="1">
+            <a:off x="4483184" y="2887637"/>
+            <a:ext cx="378110" cy="13549"/>
+          </a:xfrm>
+          <a:prstGeom prst="straightConnector1">
+            <a:avLst/>
+          </a:prstGeom>
+          <a:ln w="28575">
+            <a:tailEnd type="triangle"/>
+          </a:ln>
+        </p:spPr>
+        <p:style>
+          <a:lnRef idx="1">
+            <a:schemeClr val="accent2"/>
+          </a:lnRef>
+          <a:fillRef idx="0">
+            <a:schemeClr val="accent2"/>
+          </a:fillRef>
+          <a:effectRef idx="0">
+            <a:schemeClr val="accent2"/>
+          </a:effectRef>
+          <a:fontRef idx="minor">
+            <a:schemeClr val="tx1"/>
+          </a:fontRef>
+        </p:style>
+      </p:cxnSp>
+      <mc:AlternateContent xmlns:mc="http://schemas.openxmlformats.org/markup-compatibility/2006">
+        <mc:Choice xmlns:a14="http://schemas.microsoft.com/office/drawing/2010/main" Requires="a14">
           <p:sp>
             <p:nvSpPr>
               <p:cNvPr id="85" name="TextBox 84">
@@ -5561,7 +5355,7 @@
                             <a:rPr lang="en-US" b="0" i="1" smtClean="0">
                               <a:latin typeface="Cambria Math" panose="02040503050406030204" pitchFamily="18" charset="0"/>
                             </a:rPr>
-                            <m:t>𝑅</m:t>
+                            <m:t>2</m:t>
                           </m:r>
                         </m:sub>
                       </m:sSub>
@@ -5573,7 +5367,7 @@
             </p:txBody>
           </p:sp>
         </mc:Choice>
-        <mc:Fallback xmlns="">
+        <mc:Fallback>
           <p:sp>
             <p:nvSpPr>
               <p:cNvPr id="85" name="TextBox 84">
@@ -5597,9 +5391,9 @@
                 <a:avLst/>
               </a:prstGeom>
               <a:blipFill>
-                <a:blip r:embed="rId6"/>
+                <a:blip r:embed="rId4"/>
                 <a:stretch>
-                  <a:fillRect r="-7843"/>
+                  <a:fillRect r="-3922"/>
                 </a:stretch>
               </a:blipFill>
             </p:spPr>
@@ -5620,82 +5414,62 @@
       </mc:AlternateContent>
       <p:sp>
         <p:nvSpPr>
-          <p:cNvPr id="47" name="TextBox 46">
-            <a:extLst>
-              <a:ext uri="{FF2B5EF4-FFF2-40B4-BE49-F238E27FC236}">
-                <a16:creationId xmlns:a16="http://schemas.microsoft.com/office/drawing/2014/main" id="{3D2CC503-05BD-4193-9C13-FAB23221CFDE}"/>
-              </a:ext>
-            </a:extLst>
-          </p:cNvPr>
-          <p:cNvSpPr txBox="1"/>
+          <p:cNvPr id="69" name="Arrow: Curved Down 68">
+            <a:extLst>
+              <a:ext uri="{FF2B5EF4-FFF2-40B4-BE49-F238E27FC236}">
+                <a16:creationId xmlns:a16="http://schemas.microsoft.com/office/drawing/2014/main" id="{E0C5E632-6CD5-48E4-931A-79A3AA05FA50}"/>
+              </a:ext>
+            </a:extLst>
+          </p:cNvPr>
+          <p:cNvSpPr/>
           <p:nvPr/>
         </p:nvSpPr>
         <p:spPr>
-          <a:xfrm>
-            <a:off x="5279854" y="2722696"/>
-            <a:ext cx="300082" cy="369332"/>
+          <a:xfrm flipH="1" flipV="1">
+            <a:off x="2562966" y="4238593"/>
+            <a:ext cx="1665612" cy="843533"/>
           </a:xfrm>
-          <a:prstGeom prst="rect">
+          <a:prstGeom prst="curvedDownArrow">
             <a:avLst/>
           </a:prstGeom>
           <a:noFill/>
+          <a:ln/>
         </p:spPr>
+        <p:style>
+          <a:lnRef idx="2">
+            <a:schemeClr val="accent2"/>
+          </a:lnRef>
+          <a:fillRef idx="1">
+            <a:schemeClr val="lt1"/>
+          </a:fillRef>
+          <a:effectRef idx="0">
+            <a:schemeClr val="accent2"/>
+          </a:effectRef>
+          <a:fontRef idx="minor">
+            <a:schemeClr val="dk1"/>
+          </a:fontRef>
+        </p:style>
         <p:txBody>
-          <a:bodyPr wrap="none" rtlCol="0">
-            <a:spAutoFit/>
-          </a:bodyPr>
+          <a:bodyPr rtlCol="0" anchor="ctr"/>
           <a:lstStyle/>
           <a:p>
-            <a:r>
-              <a:rPr lang="en-US" dirty="0"/>
-              <a:t>+</a:t>
-            </a:r>
+            <a:pPr algn="ctr"/>
+            <a:endParaRPr lang="en-US">
+              <a:solidFill>
+                <a:schemeClr val="tx1"/>
+              </a:solidFill>
+            </a:endParaRPr>
           </a:p>
         </p:txBody>
       </p:sp>
-      <p:sp>
-        <p:nvSpPr>
-          <p:cNvPr id="64" name="TextBox 63">
-            <a:extLst>
-              <a:ext uri="{FF2B5EF4-FFF2-40B4-BE49-F238E27FC236}">
-                <a16:creationId xmlns:a16="http://schemas.microsoft.com/office/drawing/2014/main" id="{328394D4-AE89-480A-897C-4603DB3D124C}"/>
-              </a:ext>
-            </a:extLst>
-          </p:cNvPr>
-          <p:cNvSpPr txBox="1"/>
-          <p:nvPr/>
-        </p:nvSpPr>
-        <p:spPr>
-          <a:xfrm>
-            <a:off x="5279854" y="3913477"/>
-            <a:ext cx="255198" cy="369332"/>
-          </a:xfrm>
-          <a:prstGeom prst="rect">
-            <a:avLst/>
-          </a:prstGeom>
-          <a:noFill/>
-        </p:spPr>
-        <p:txBody>
-          <a:bodyPr wrap="none" rtlCol="0">
-            <a:spAutoFit/>
-          </a:bodyPr>
-          <a:lstStyle/>
-          <a:p>
-            <a:r>
-              <a:rPr lang="en-US" dirty="0"/>
-              <a:t>-</a:t>
-            </a:r>
-          </a:p>
-        </p:txBody>
-      </p:sp>
-      <mc:AlternateContent xmlns:mc="http://schemas.openxmlformats.org/markup-compatibility/2006" xmlns:a14="http://schemas.microsoft.com/office/drawing/2010/main">
-        <mc:Choice Requires="a14">
+      <mc:AlternateContent xmlns:mc="http://schemas.openxmlformats.org/markup-compatibility/2006">
+        <mc:Choice xmlns:a14="http://schemas.microsoft.com/office/drawing/2010/main" Requires="a14">
           <p:sp>
             <p:nvSpPr>
-              <p:cNvPr id="65" name="TextBox 64">
+              <p:cNvPr id="70" name="TextBox 69">
                 <a:extLst>
                   <a:ext uri="{FF2B5EF4-FFF2-40B4-BE49-F238E27FC236}">
-                    <a16:creationId xmlns:a16="http://schemas.microsoft.com/office/drawing/2014/main" id="{08D727FB-79DE-41FE-A111-6E03D673A162}"/>
+                    <a16:creationId xmlns:a16="http://schemas.microsoft.com/office/drawing/2014/main" id="{1FDA9186-ABF7-4BB9-AE8B-31139753E6A1}"/>
                   </a:ext>
                 </a:extLst>
               </p:cNvPr>
@@ -5704,8 +5478,8 @@
             </p:nvSpPr>
             <p:spPr>
               <a:xfrm>
-                <a:off x="5579936" y="3273786"/>
-                <a:ext cx="314270" cy="369332"/>
+                <a:off x="3181200" y="5168678"/>
+                <a:ext cx="414601" cy="276999"/>
               </a:xfrm>
               <a:prstGeom prst="rect">
                 <a:avLst/>
@@ -5713,7 +5487,7 @@
               <a:noFill/>
             </p:spPr>
             <p:txBody>
-              <a:bodyPr wrap="square" rtlCol="0">
+              <a:bodyPr wrap="none" lIns="0" tIns="0" rIns="0" bIns="0" rtlCol="0">
                 <a:spAutoFit/>
               </a:bodyPr>
               <a:lstStyle/>
@@ -5730,23 +5504,26 @@
                           <m:ctrlPr>
                             <a:rPr lang="en-US" b="0" i="1" smtClean="0">
                               <a:latin typeface="Cambria Math" panose="02040503050406030204" pitchFamily="18" charset="0"/>
+                              <a:ea typeface="Cambria Math" panose="02040503050406030204" pitchFamily="18" charset="0"/>
                             </a:rPr>
                           </m:ctrlPr>
                         </m:sSubPr>
                         <m:e>
                           <m:r>
-                            <a:rPr lang="en-US" b="0" i="1" smtClean="0">
+                            <a:rPr lang="en-US" i="1" smtClean="0">
                               <a:latin typeface="Cambria Math" panose="02040503050406030204" pitchFamily="18" charset="0"/>
+                              <a:ea typeface="Cambria Math" panose="02040503050406030204" pitchFamily="18" charset="0"/>
                             </a:rPr>
-                            <m:t>𝑈</m:t>
+                            <m:t>𝜓</m:t>
                           </m:r>
                         </m:e>
                         <m:sub>
                           <m:r>
                             <a:rPr lang="en-US" b="0" i="1" smtClean="0">
                               <a:latin typeface="Cambria Math" panose="02040503050406030204" pitchFamily="18" charset="0"/>
+                              <a:ea typeface="Cambria Math" panose="02040503050406030204" pitchFamily="18" charset="0"/>
                             </a:rPr>
-                            <m:t>𝑅</m:t>
+                            <m:t>12</m:t>
                           </m:r>
                         </m:sub>
                       </m:sSub>
@@ -5758,13 +5535,13 @@
             </p:txBody>
           </p:sp>
         </mc:Choice>
-        <mc:Fallback xmlns="">
+        <mc:Fallback>
           <p:sp>
             <p:nvSpPr>
-              <p:cNvPr id="65" name="TextBox 64">
+              <p:cNvPr id="70" name="TextBox 69">
                 <a:extLst>
                   <a:ext uri="{FF2B5EF4-FFF2-40B4-BE49-F238E27FC236}">
-                    <a16:creationId xmlns:a16="http://schemas.microsoft.com/office/drawing/2014/main" id="{08D727FB-79DE-41FE-A111-6E03D673A162}"/>
+                    <a16:creationId xmlns:a16="http://schemas.microsoft.com/office/drawing/2014/main" id="{1FDA9186-ABF7-4BB9-AE8B-31139753E6A1}"/>
                   </a:ext>
                 </a:extLst>
               </p:cNvPr>
@@ -5775,16 +5552,16 @@
             </p:nvSpPr>
             <p:spPr>
               <a:xfrm>
-                <a:off x="5579936" y="3273786"/>
-                <a:ext cx="314270" cy="369332"/>
+                <a:off x="3181200" y="5168678"/>
+                <a:ext cx="414601" cy="276999"/>
               </a:xfrm>
               <a:prstGeom prst="rect">
                 <a:avLst/>
               </a:prstGeom>
               <a:blipFill>
-                <a:blip r:embed="rId7"/>
+                <a:blip r:embed="rId5"/>
                 <a:stretch>
-                  <a:fillRect r="-28846"/>
+                  <a:fillRect l="-19118" t="-2222" r="-5882" b="-35556"/>
                 </a:stretch>
               </a:blipFill>
             </p:spPr>
@@ -5803,6 +5580,86 @@
           </p:sp>
         </mc:Fallback>
       </mc:AlternateContent>
+      <p:sp>
+        <p:nvSpPr>
+          <p:cNvPr id="7" name="TextBox 6">
+            <a:extLst>
+              <a:ext uri="{FF2B5EF4-FFF2-40B4-BE49-F238E27FC236}">
+                <a16:creationId xmlns:a16="http://schemas.microsoft.com/office/drawing/2014/main" id="{F70921AC-00E8-4979-B5AC-3C9D4E41E5A3}"/>
+              </a:ext>
+            </a:extLst>
+          </p:cNvPr>
+          <p:cNvSpPr txBox="1"/>
+          <p:nvPr/>
+        </p:nvSpPr>
+        <p:spPr>
+          <a:xfrm>
+            <a:off x="1354160" y="4897460"/>
+            <a:ext cx="866683" cy="369332"/>
+          </a:xfrm>
+          <a:prstGeom prst="rect">
+            <a:avLst/>
+          </a:prstGeom>
+          <a:noFill/>
+        </p:spPr>
+        <p:txBody>
+          <a:bodyPr wrap="square" rtlCol="0">
+            <a:spAutoFit/>
+          </a:bodyPr>
+          <a:lstStyle/>
+          <a:p>
+            <a:r>
+              <a:rPr lang="zh-CN" altLang="en-US" dirty="0"/>
+              <a:t>线圈</a:t>
+            </a:r>
+            <a:r>
+              <a:rPr lang="en-US" altLang="zh-CN" dirty="0"/>
+              <a:t>1</a:t>
+            </a:r>
+            <a:endParaRPr lang="en-US" dirty="0"/>
+          </a:p>
+        </p:txBody>
+      </p:sp>
+      <p:sp>
+        <p:nvSpPr>
+          <p:cNvPr id="71" name="TextBox 70">
+            <a:extLst>
+              <a:ext uri="{FF2B5EF4-FFF2-40B4-BE49-F238E27FC236}">
+                <a16:creationId xmlns:a16="http://schemas.microsoft.com/office/drawing/2014/main" id="{ECF36A6D-3FE9-4039-8B0F-6226962AF7E3}"/>
+              </a:ext>
+            </a:extLst>
+          </p:cNvPr>
+          <p:cNvSpPr txBox="1"/>
+          <p:nvPr/>
+        </p:nvSpPr>
+        <p:spPr>
+          <a:xfrm>
+            <a:off x="4861294" y="4897460"/>
+            <a:ext cx="866683" cy="369332"/>
+          </a:xfrm>
+          <a:prstGeom prst="rect">
+            <a:avLst/>
+          </a:prstGeom>
+          <a:noFill/>
+        </p:spPr>
+        <p:txBody>
+          <a:bodyPr wrap="square" rtlCol="0">
+            <a:spAutoFit/>
+          </a:bodyPr>
+          <a:lstStyle/>
+          <a:p>
+            <a:r>
+              <a:rPr lang="zh-CN" altLang="en-US" dirty="0"/>
+              <a:t>线圈</a:t>
+            </a:r>
+            <a:r>
+              <a:rPr lang="en-US" altLang="zh-CN" dirty="0"/>
+              <a:t>2</a:t>
+            </a:r>
+            <a:endParaRPr lang="en-US" dirty="0"/>
+          </a:p>
+        </p:txBody>
+      </p:sp>
     </p:spTree>
     <p:extLst>
       <p:ext uri="{BB962C8B-B14F-4D97-AF65-F5344CB8AC3E}">

</xml_diff>